<commit_message>
Implement entity manipulation (get, add, update and delete)
</commit_message>
<xml_diff>
--- a/Tags/db/Design – MongoDB.pptx
+++ b/Tags/db/Design – MongoDB.pptx
@@ -10,11 +10,12 @@
     <p:sldId id="258" r:id="rId4"/>
     <p:sldId id="259" r:id="rId5"/>
     <p:sldId id="260" r:id="rId6"/>
-    <p:sldId id="261" r:id="rId7"/>
-    <p:sldId id="262" r:id="rId8"/>
-    <p:sldId id="263" r:id="rId9"/>
-    <p:sldId id="265" r:id="rId10"/>
-    <p:sldId id="264" r:id="rId11"/>
+    <p:sldId id="266" r:id="rId7"/>
+    <p:sldId id="261" r:id="rId8"/>
+    <p:sldId id="262" r:id="rId9"/>
+    <p:sldId id="263" r:id="rId10"/>
+    <p:sldId id="265" r:id="rId11"/>
+    <p:sldId id="264" r:id="rId12"/>
   </p:sldIdLst>
   <p:sldSz cx="9144000" cy="6858000" type="screen4x3"/>
   <p:notesSz cx="6858000" cy="9144000"/>
@@ -297,7 +298,7 @@
           <a:p>
             <a:fld id="{2CF7B219-CE62-4222-8A1C-38F5DC49B83D}" type="datetimeFigureOut">
               <a:rPr lang="en-US" smtClean="0"/>
-              <a:t>11/13/2016</a:t>
+              <a:t>11/30/2016</a:t>
             </a:fld>
             <a:endParaRPr lang="en-US"/>
           </a:p>
@@ -467,7 +468,7 @@
           <a:p>
             <a:fld id="{2CF7B219-CE62-4222-8A1C-38F5DC49B83D}" type="datetimeFigureOut">
               <a:rPr lang="en-US" smtClean="0"/>
-              <a:t>11/13/2016</a:t>
+              <a:t>11/30/2016</a:t>
             </a:fld>
             <a:endParaRPr lang="en-US"/>
           </a:p>
@@ -647,7 +648,7 @@
           <a:p>
             <a:fld id="{2CF7B219-CE62-4222-8A1C-38F5DC49B83D}" type="datetimeFigureOut">
               <a:rPr lang="en-US" smtClean="0"/>
-              <a:t>11/13/2016</a:t>
+              <a:t>11/30/2016</a:t>
             </a:fld>
             <a:endParaRPr lang="en-US"/>
           </a:p>
@@ -817,7 +818,7 @@
           <a:p>
             <a:fld id="{2CF7B219-CE62-4222-8A1C-38F5DC49B83D}" type="datetimeFigureOut">
               <a:rPr lang="en-US" smtClean="0"/>
-              <a:t>11/13/2016</a:t>
+              <a:t>11/30/2016</a:t>
             </a:fld>
             <a:endParaRPr lang="en-US"/>
           </a:p>
@@ -1063,7 +1064,7 @@
           <a:p>
             <a:fld id="{2CF7B219-CE62-4222-8A1C-38F5DC49B83D}" type="datetimeFigureOut">
               <a:rPr lang="en-US" smtClean="0"/>
-              <a:t>11/13/2016</a:t>
+              <a:t>11/30/2016</a:t>
             </a:fld>
             <a:endParaRPr lang="en-US"/>
           </a:p>
@@ -1351,7 +1352,7 @@
           <a:p>
             <a:fld id="{2CF7B219-CE62-4222-8A1C-38F5DC49B83D}" type="datetimeFigureOut">
               <a:rPr lang="en-US" smtClean="0"/>
-              <a:t>11/13/2016</a:t>
+              <a:t>11/30/2016</a:t>
             </a:fld>
             <a:endParaRPr lang="en-US"/>
           </a:p>
@@ -1773,7 +1774,7 @@
           <a:p>
             <a:fld id="{2CF7B219-CE62-4222-8A1C-38F5DC49B83D}" type="datetimeFigureOut">
               <a:rPr lang="en-US" smtClean="0"/>
-              <a:t>11/13/2016</a:t>
+              <a:t>11/30/2016</a:t>
             </a:fld>
             <a:endParaRPr lang="en-US"/>
           </a:p>
@@ -1891,7 +1892,7 @@
           <a:p>
             <a:fld id="{2CF7B219-CE62-4222-8A1C-38F5DC49B83D}" type="datetimeFigureOut">
               <a:rPr lang="en-US" smtClean="0"/>
-              <a:t>11/13/2016</a:t>
+              <a:t>11/30/2016</a:t>
             </a:fld>
             <a:endParaRPr lang="en-US"/>
           </a:p>
@@ -1986,7 +1987,7 @@
           <a:p>
             <a:fld id="{2CF7B219-CE62-4222-8A1C-38F5DC49B83D}" type="datetimeFigureOut">
               <a:rPr lang="en-US" smtClean="0"/>
-              <a:t>11/13/2016</a:t>
+              <a:t>11/30/2016</a:t>
             </a:fld>
             <a:endParaRPr lang="en-US"/>
           </a:p>
@@ -2263,7 +2264,7 @@
           <a:p>
             <a:fld id="{2CF7B219-CE62-4222-8A1C-38F5DC49B83D}" type="datetimeFigureOut">
               <a:rPr lang="en-US" smtClean="0"/>
-              <a:t>11/13/2016</a:t>
+              <a:t>11/30/2016</a:t>
             </a:fld>
             <a:endParaRPr lang="en-US"/>
           </a:p>
@@ -2516,7 +2517,7 @@
           <a:p>
             <a:fld id="{2CF7B219-CE62-4222-8A1C-38F5DC49B83D}" type="datetimeFigureOut">
               <a:rPr lang="en-US" smtClean="0"/>
-              <a:t>11/13/2016</a:t>
+              <a:t>11/30/2016</a:t>
             </a:fld>
             <a:endParaRPr lang="en-US"/>
           </a:p>
@@ -2729,7 +2730,7 @@
           <a:p>
             <a:fld id="{2CF7B219-CE62-4222-8A1C-38F5DC49B83D}" type="datetimeFigureOut">
               <a:rPr lang="en-US" smtClean="0"/>
-              <a:t>11/13/2016</a:t>
+              <a:t>11/30/2016</a:t>
             </a:fld>
             <a:endParaRPr lang="en-US"/>
           </a:p>
@@ -3180,6 +3181,233 @@
           <a:lstStyle/>
           <a:p>
             <a:r>
+              <a:rPr lang="en-US" dirty="0" smtClean="0"/>
+              <a:t>Notes</a:t>
+            </a:r>
+            <a:endParaRPr lang="en-US" dirty="0"/>
+          </a:p>
+        </p:txBody>
+      </p:sp>
+      <p:sp>
+        <p:nvSpPr>
+          <p:cNvPr id="3" name="Content Placeholder 2"/>
+          <p:cNvSpPr>
+            <a:spLocks noGrp="1"/>
+          </p:cNvSpPr>
+          <p:nvPr>
+            <p:ph idx="1"/>
+          </p:nvPr>
+        </p:nvSpPr>
+        <p:spPr>
+          <a:xfrm>
+            <a:off x="457200" y="1295400"/>
+            <a:ext cx="8229600" cy="4830763"/>
+          </a:xfrm>
+        </p:spPr>
+        <p:txBody>
+          <a:bodyPr>
+            <a:normAutofit fontScale="70000" lnSpcReduction="20000"/>
+          </a:bodyPr>
+          <a:lstStyle/>
+          <a:p>
+            <a:pPr marL="0" indent="0">
+              <a:buNone/>
+            </a:pPr>
+            <a:r>
+              <a:rPr lang="en-US" dirty="0"/>
+              <a:t>D:\db\ConfigDB&gt;mongo --version</a:t>
+            </a:r>
+          </a:p>
+          <a:p>
+            <a:pPr marL="0" indent="0">
+              <a:buNone/>
+            </a:pPr>
+            <a:r>
+              <a:rPr lang="en-US" b="1" dirty="0"/>
+              <a:t>MongoDB shell version: 3.2.8</a:t>
+            </a:r>
+          </a:p>
+          <a:p>
+            <a:pPr marL="0" indent="0">
+              <a:buNone/>
+            </a:pPr>
+            <a:endParaRPr lang="en-US" dirty="0"/>
+          </a:p>
+          <a:p>
+            <a:pPr marL="0" indent="0">
+              <a:buNone/>
+            </a:pPr>
+            <a:r>
+              <a:rPr lang="en-US" dirty="0"/>
+              <a:t>D:\db\ConfigDB&gt;mongod --version</a:t>
+            </a:r>
+          </a:p>
+          <a:p>
+            <a:pPr marL="0" indent="0">
+              <a:buNone/>
+            </a:pPr>
+            <a:r>
+              <a:rPr lang="en-US" b="1" dirty="0" err="1"/>
+              <a:t>db</a:t>
+            </a:r>
+            <a:r>
+              <a:rPr lang="en-US" b="1" dirty="0"/>
+              <a:t> version v3.2.8</a:t>
+            </a:r>
+          </a:p>
+          <a:p>
+            <a:pPr marL="0" indent="0">
+              <a:buNone/>
+            </a:pPr>
+            <a:r>
+              <a:rPr lang="en-US" dirty="0" err="1"/>
+              <a:t>git</a:t>
+            </a:r>
+            <a:r>
+              <a:rPr lang="en-US" dirty="0"/>
+              <a:t> version: ed70e33130c977bda0024c125b56d159573dbaf0</a:t>
+            </a:r>
+          </a:p>
+          <a:p>
+            <a:pPr marL="0" indent="0">
+              <a:buNone/>
+            </a:pPr>
+            <a:r>
+              <a:rPr lang="en-US" dirty="0"/>
+              <a:t>OpenSSL version: OpenSSL 1.0.1p-fips 9 Jul 2015</a:t>
+            </a:r>
+          </a:p>
+          <a:p>
+            <a:pPr marL="0" indent="0">
+              <a:buNone/>
+            </a:pPr>
+            <a:r>
+              <a:rPr lang="en-US" dirty="0"/>
+              <a:t>allocator: </a:t>
+            </a:r>
+            <a:r>
+              <a:rPr lang="en-US" dirty="0" err="1"/>
+              <a:t>tcmalloc</a:t>
+            </a:r>
+            <a:endParaRPr lang="en-US" dirty="0"/>
+          </a:p>
+          <a:p>
+            <a:pPr marL="0" indent="0">
+              <a:buNone/>
+            </a:pPr>
+            <a:r>
+              <a:rPr lang="en-US" dirty="0"/>
+              <a:t>modules: none</a:t>
+            </a:r>
+          </a:p>
+          <a:p>
+            <a:pPr marL="0" indent="0">
+              <a:buNone/>
+            </a:pPr>
+            <a:r>
+              <a:rPr lang="en-US" dirty="0"/>
+              <a:t>build environment:</a:t>
+            </a:r>
+          </a:p>
+          <a:p>
+            <a:pPr marL="0" indent="0">
+              <a:buNone/>
+            </a:pPr>
+            <a:r>
+              <a:rPr lang="en-US" dirty="0"/>
+              <a:t>    </a:t>
+            </a:r>
+            <a:r>
+              <a:rPr lang="en-US" dirty="0" err="1"/>
+              <a:t>distmod</a:t>
+            </a:r>
+            <a:r>
+              <a:rPr lang="en-US" dirty="0"/>
+              <a:t>: 2008plus-ssl</a:t>
+            </a:r>
+          </a:p>
+          <a:p>
+            <a:pPr marL="0" indent="0">
+              <a:buNone/>
+            </a:pPr>
+            <a:r>
+              <a:rPr lang="en-US" dirty="0"/>
+              <a:t>    </a:t>
+            </a:r>
+            <a:r>
+              <a:rPr lang="en-US" dirty="0" err="1"/>
+              <a:t>distarch</a:t>
+            </a:r>
+            <a:r>
+              <a:rPr lang="en-US" dirty="0"/>
+              <a:t>: x86_64</a:t>
+            </a:r>
+          </a:p>
+          <a:p>
+            <a:pPr marL="0" indent="0">
+              <a:buNone/>
+            </a:pPr>
+            <a:r>
+              <a:rPr lang="en-US" dirty="0"/>
+              <a:t>    </a:t>
+            </a:r>
+            <a:r>
+              <a:rPr lang="en-US" dirty="0" err="1"/>
+              <a:t>target_arch</a:t>
+            </a:r>
+            <a:r>
+              <a:rPr lang="en-US" dirty="0"/>
+              <a:t>: x86_64</a:t>
+            </a:r>
+          </a:p>
+        </p:txBody>
+      </p:sp>
+    </p:spTree>
+    <p:extLst>
+      <p:ext uri="{BB962C8B-B14F-4D97-AF65-F5344CB8AC3E}">
+        <p14:creationId xmlns:p14="http://schemas.microsoft.com/office/powerpoint/2010/main" val="1764804038"/>
+      </p:ext>
+    </p:extLst>
+  </p:cSld>
+  <p:clrMapOvr>
+    <a:masterClrMapping/>
+  </p:clrMapOvr>
+</p:sld>
+</file>
+
+<file path=ppt/slides/slide11.xml><?xml version="1.0" encoding="utf-8"?>
+<p:sld xmlns:a="http://schemas.openxmlformats.org/drawingml/2006/main" xmlns:r="http://schemas.openxmlformats.org/officeDocument/2006/relationships" xmlns:p="http://schemas.openxmlformats.org/presentationml/2006/main">
+  <p:cSld>
+    <p:spTree>
+      <p:nvGrpSpPr>
+        <p:cNvPr id="1" name=""/>
+        <p:cNvGrpSpPr/>
+        <p:nvPr/>
+      </p:nvGrpSpPr>
+      <p:grpSpPr>
+        <a:xfrm>
+          <a:off x="0" y="0"/>
+          <a:ext cx="0" cy="0"/>
+          <a:chOff x="0" y="0"/>
+          <a:chExt cx="0" cy="0"/>
+        </a:xfrm>
+      </p:grpSpPr>
+      <p:sp>
+        <p:nvSpPr>
+          <p:cNvPr id="2" name="Title 1"/>
+          <p:cNvSpPr>
+            <a:spLocks noGrp="1"/>
+          </p:cNvSpPr>
+          <p:nvPr>
+            <p:ph type="title"/>
+          </p:nvPr>
+        </p:nvSpPr>
+        <p:spPr/>
+        <p:txBody>
+          <a:bodyPr/>
+          <a:lstStyle/>
+          <a:p>
+            <a:r>
               <a:rPr lang="en-US" dirty="0" err="1" smtClean="0"/>
               <a:t>Replicaset</a:t>
             </a:r>
@@ -3620,7 +3848,7 @@
         <p:spPr/>
         <p:txBody>
           <a:bodyPr>
-            <a:normAutofit/>
+            <a:normAutofit lnSpcReduction="10000"/>
           </a:bodyPr>
           <a:lstStyle/>
           <a:p>
@@ -3686,7 +3914,28 @@
             </a:r>
             <a:r>
               <a:rPr lang="en-US" dirty="0" smtClean="0"/>
-              <a:t>state: “Waiting” // waiting, empty, paid,…</a:t>
+              <a:t>state: “Waiting”, // waiting, empty, paid,…</a:t>
+            </a:r>
+          </a:p>
+          <a:p>
+            <a:pPr marL="0" indent="0">
+              <a:buNone/>
+            </a:pPr>
+            <a:r>
+              <a:rPr lang="en-US" dirty="0" smtClean="0"/>
+              <a:t>	</a:t>
+            </a:r>
+            <a:r>
+              <a:rPr lang="en-US" dirty="0" err="1"/>
+              <a:t>o</a:t>
+            </a:r>
+            <a:r>
+              <a:rPr lang="en-US" smtClean="0"/>
+              <a:t>rder_id</a:t>
+            </a:r>
+            <a:r>
+              <a:rPr lang="en-US" dirty="0" smtClean="0"/>
+              <a:t>: 1 </a:t>
             </a:r>
             <a:endParaRPr lang="en-US" dirty="0"/>
           </a:p>
@@ -3838,13 +4087,14 @@
               <a:t>image: </a:t>
             </a:r>
             <a:r>
-              <a:rPr lang="en-US" dirty="0" err="1" smtClean="0"/>
-              <a:t>BinaryData</a:t>
-            </a:r>
-            <a:r>
-              <a:rPr lang="en-US" dirty="0" smtClean="0"/>
-              <a:t> // or URL?</a:t>
-            </a:r>
+              <a:rPr lang="en-US" dirty="0" smtClean="0"/>
+              <a:t>URL //</a:t>
+            </a:r>
+            <a:r>
+              <a:rPr lang="en-US" smtClean="0"/>
+              <a:t>or binary?</a:t>
+            </a:r>
+            <a:endParaRPr lang="en-US" dirty="0" smtClean="0"/>
           </a:p>
           <a:p>
             <a:pPr marL="0" indent="0">
@@ -4200,58 +4450,191 @@
         </p:nvSpPr>
         <p:spPr/>
         <p:txBody>
+          <a:bodyPr/>
+          <a:lstStyle/>
+          <a:p>
+            <a:r>
+              <a:rPr lang="en-US" dirty="0" smtClean="0"/>
+              <a:t>User</a:t>
+            </a:r>
+            <a:endParaRPr lang="en-US" dirty="0"/>
+          </a:p>
+        </p:txBody>
+      </p:sp>
+      <p:sp>
+        <p:nvSpPr>
+          <p:cNvPr id="3" name="Content Placeholder 2"/>
+          <p:cNvSpPr>
+            <a:spLocks noGrp="1"/>
+          </p:cNvSpPr>
+          <p:nvPr>
+            <p:ph idx="1"/>
+          </p:nvPr>
+        </p:nvSpPr>
+        <p:spPr/>
+        <p:txBody>
           <a:bodyPr>
-            <a:normAutofit/>
+            <a:normAutofit fontScale="85000" lnSpcReduction="20000"/>
           </a:bodyPr>
           <a:lstStyle/>
           <a:p>
-            <a:r>
-              <a:rPr lang="en-US" dirty="0" smtClean="0"/>
-              <a:t>Functions</a:t>
+            <a:pPr marL="0" indent="0">
+              <a:buNone/>
+            </a:pPr>
+            <a:r>
+              <a:rPr lang="en-US" dirty="0" smtClean="0"/>
+              <a:t>User{</a:t>
+            </a:r>
+          </a:p>
+          <a:p>
+            <a:pPr marL="0" indent="0">
+              <a:buNone/>
+            </a:pPr>
+            <a:r>
+              <a:rPr lang="en-US" dirty="0" smtClean="0"/>
+              <a:t>	_id: 0,</a:t>
+            </a:r>
+          </a:p>
+          <a:p>
+            <a:pPr marL="0" indent="0">
+              <a:buNone/>
+            </a:pPr>
+            <a:r>
+              <a:rPr lang="en-US" dirty="0"/>
+              <a:t>	</a:t>
+            </a:r>
+            <a:r>
+              <a:rPr lang="en-US" dirty="0" smtClean="0"/>
+              <a:t>name: “</a:t>
+            </a:r>
+            <a:r>
+              <a:rPr lang="en-US" dirty="0" err="1" smtClean="0"/>
+              <a:t>nguyen</a:t>
+            </a:r>
+            <a:r>
+              <a:rPr lang="en-US" dirty="0" smtClean="0"/>
+              <a:t> van a”,</a:t>
+            </a:r>
+          </a:p>
+          <a:p>
+            <a:pPr marL="0" indent="0">
+              <a:buNone/>
+            </a:pPr>
+            <a:r>
+              <a:rPr lang="en-US" dirty="0"/>
+              <a:t>	</a:t>
+            </a:r>
+            <a:r>
+              <a:rPr lang="en-US" dirty="0" smtClean="0"/>
+              <a:t>username: “username1”,</a:t>
+            </a:r>
+          </a:p>
+          <a:p>
+            <a:pPr marL="0" indent="0">
+              <a:buNone/>
+            </a:pPr>
+            <a:r>
+              <a:rPr lang="en-US" dirty="0"/>
+              <a:t>	</a:t>
+            </a:r>
+            <a:r>
+              <a:rPr lang="en-US" dirty="0" smtClean="0"/>
+              <a:t>password: “123456Aa”,</a:t>
+            </a:r>
+          </a:p>
+          <a:p>
+            <a:pPr marL="0" indent="0">
+              <a:buNone/>
+            </a:pPr>
+            <a:r>
+              <a:rPr lang="en-US" dirty="0"/>
+              <a:t>	</a:t>
+            </a:r>
+            <a:r>
+              <a:rPr lang="en-US" dirty="0" smtClean="0"/>
+              <a:t>gender: “male”,</a:t>
+            </a:r>
+          </a:p>
+          <a:p>
+            <a:pPr marL="0" indent="0">
+              <a:buNone/>
+            </a:pPr>
+            <a:r>
+              <a:rPr lang="en-US" dirty="0"/>
+              <a:t>	</a:t>
+            </a:r>
+            <a:r>
+              <a:rPr lang="en-US" dirty="0" err="1" smtClean="0"/>
+              <a:t>dob</a:t>
+            </a:r>
+            <a:r>
+              <a:rPr lang="en-US" dirty="0" smtClean="0"/>
+              <a:t>: 20/9/1992, // </a:t>
+            </a:r>
+            <a:r>
+              <a:rPr lang="en-US" smtClean="0"/>
+              <a:t>date time</a:t>
+            </a:r>
+            <a:endParaRPr lang="en-US" dirty="0" smtClean="0"/>
+          </a:p>
+          <a:p>
+            <a:pPr marL="0" indent="0">
+              <a:buNone/>
+            </a:pPr>
+            <a:r>
+              <a:rPr lang="en-US" dirty="0"/>
+              <a:t>	</a:t>
+            </a:r>
+            <a:r>
+              <a:rPr lang="en-US" dirty="0" smtClean="0"/>
+              <a:t>address: “ha </a:t>
+            </a:r>
+            <a:r>
+              <a:rPr lang="en-US" dirty="0" err="1" smtClean="0"/>
+              <a:t>noi</a:t>
+            </a:r>
+            <a:r>
+              <a:rPr lang="en-US" dirty="0" smtClean="0"/>
+              <a:t>, </a:t>
+            </a:r>
+            <a:r>
+              <a:rPr lang="en-US" dirty="0" err="1" smtClean="0"/>
+              <a:t>viet</a:t>
+            </a:r>
+            <a:r>
+              <a:rPr lang="en-US" dirty="0" smtClean="0"/>
+              <a:t> </a:t>
+            </a:r>
+            <a:r>
+              <a:rPr lang="en-US" dirty="0" err="1" smtClean="0"/>
+              <a:t>nam</a:t>
+            </a:r>
+            <a:r>
+              <a:rPr lang="en-US" dirty="0" smtClean="0"/>
+              <a:t>”,</a:t>
+            </a:r>
+          </a:p>
+          <a:p>
+            <a:pPr marL="0" indent="0">
+              <a:buNone/>
+            </a:pPr>
+            <a:r>
+              <a:rPr lang="en-US" dirty="0"/>
+              <a:t>	</a:t>
+            </a:r>
+            <a:r>
+              <a:rPr lang="en-US" dirty="0" smtClean="0"/>
+              <a:t>phone: “0166123456”</a:t>
             </a:r>
             <a:endParaRPr lang="en-US" dirty="0"/>
           </a:p>
-        </p:txBody>
-      </p:sp>
-      <p:sp>
-        <p:nvSpPr>
-          <p:cNvPr id="3" name="Content Placeholder 2"/>
-          <p:cNvSpPr>
-            <a:spLocks noGrp="1"/>
-          </p:cNvSpPr>
-          <p:nvPr>
-            <p:ph idx="1"/>
-          </p:nvPr>
-        </p:nvSpPr>
-        <p:spPr/>
-        <p:txBody>
-          <a:bodyPr/>
-          <a:lstStyle/>
-          <a:p>
-            <a:r>
-              <a:rPr lang="en-US" dirty="0" smtClean="0"/>
-              <a:t>Table:</a:t>
-            </a:r>
-          </a:p>
-          <a:p>
-            <a:pPr lvl="1"/>
-            <a:r>
-              <a:rPr lang="en-US" dirty="0" smtClean="0"/>
-              <a:t>Get all tables, note that application will be responsible for construct the floor</a:t>
-            </a:r>
-          </a:p>
-          <a:p>
-            <a:pPr lvl="1"/>
-            <a:r>
-              <a:rPr lang="en-US" dirty="0" smtClean="0"/>
-              <a:t>Update table state</a:t>
-            </a:r>
-          </a:p>
-          <a:p>
-            <a:pPr lvl="1"/>
-            <a:r>
-              <a:rPr lang="en-US" dirty="0" smtClean="0"/>
-              <a:t>Create new table</a:t>
+          <a:p>
+            <a:pPr marL="0" indent="0">
+              <a:buNone/>
+            </a:pPr>
+            <a:r>
+              <a:rPr lang="en-US" dirty="0" smtClean="0"/>
+              <a:t>}</a:t>
             </a:r>
             <a:endParaRPr lang="en-US" dirty="0"/>
           </a:p>
@@ -4260,7 +4643,7 @@
     </p:spTree>
     <p:extLst>
       <p:ext uri="{BB962C8B-B14F-4D97-AF65-F5344CB8AC3E}">
-        <p14:creationId xmlns:p14="http://schemas.microsoft.com/office/powerpoint/2010/main" val="3965288943"/>
+        <p14:creationId xmlns:p14="http://schemas.microsoft.com/office/powerpoint/2010/main" val="3735024663"/>
       </p:ext>
     </p:extLst>
   </p:cSld>
@@ -4329,22 +4712,37 @@
           <a:p>
             <a:r>
               <a:rPr lang="en-US" dirty="0" smtClean="0"/>
-              <a:t>Food:</a:t>
+              <a:t>Table:</a:t>
             </a:r>
           </a:p>
           <a:p>
             <a:pPr lvl="1"/>
             <a:r>
               <a:rPr lang="en-US" dirty="0" smtClean="0"/>
-              <a:t>Get all foods when user makes order</a:t>
-            </a:r>
+              <a:t>Get all tables, note that application will be responsible for construct the floor</a:t>
+            </a:r>
+          </a:p>
+          <a:p>
+            <a:pPr lvl="1"/>
+            <a:r>
+              <a:rPr lang="en-US" dirty="0" smtClean="0"/>
+              <a:t>Update table state</a:t>
+            </a:r>
+          </a:p>
+          <a:p>
+            <a:pPr lvl="1"/>
+            <a:r>
+              <a:rPr lang="en-US" dirty="0" smtClean="0"/>
+              <a:t>Create new table</a:t>
+            </a:r>
+            <a:endParaRPr lang="en-US" dirty="0"/>
           </a:p>
         </p:txBody>
       </p:sp>
     </p:spTree>
     <p:extLst>
       <p:ext uri="{BB962C8B-B14F-4D97-AF65-F5344CB8AC3E}">
-        <p14:creationId xmlns:p14="http://schemas.microsoft.com/office/powerpoint/2010/main" val="7701401"/>
+        <p14:creationId xmlns:p14="http://schemas.microsoft.com/office/powerpoint/2010/main" val="3965288943"/>
       </p:ext>
     </p:extLst>
   </p:cSld>
@@ -4413,48 +4811,22 @@
           <a:p>
             <a:r>
               <a:rPr lang="en-US" dirty="0" smtClean="0"/>
-              <a:t>Order:</a:t>
+              <a:t>Food:</a:t>
             </a:r>
           </a:p>
           <a:p>
             <a:pPr lvl="1"/>
             <a:r>
               <a:rPr lang="en-US" dirty="0" smtClean="0"/>
-              <a:t>Get orders by list of states (</a:t>
-            </a:r>
-            <a:r>
-              <a:rPr lang="en-US" dirty="0" err="1" smtClean="0"/>
-              <a:t>e.x</a:t>
-            </a:r>
-            <a:r>
-              <a:rPr lang="en-US" dirty="0" smtClean="0"/>
-              <a:t>: [paid, canceled])</a:t>
-            </a:r>
-          </a:p>
-          <a:p>
-            <a:pPr lvl="1"/>
-            <a:r>
-              <a:rPr lang="en-US" dirty="0" smtClean="0"/>
-              <a:t>Get order of a particular table by table id</a:t>
-            </a:r>
-          </a:p>
-          <a:p>
-            <a:pPr lvl="1"/>
-            <a:r>
-              <a:rPr lang="en-US" dirty="0" smtClean="0"/>
-              <a:t>Update order info (state, add/remove food,…)</a:t>
-            </a:r>
-          </a:p>
-          <a:p>
-            <a:pPr lvl="1"/>
-            <a:endParaRPr lang="en-US" dirty="0"/>
+              <a:t>Get all foods when user makes order</a:t>
+            </a:r>
           </a:p>
         </p:txBody>
       </p:sp>
     </p:spTree>
     <p:extLst>
       <p:ext uri="{BB962C8B-B14F-4D97-AF65-F5344CB8AC3E}">
-        <p14:creationId xmlns:p14="http://schemas.microsoft.com/office/powerpoint/2010/main" val="1116237151"/>
+        <p14:creationId xmlns:p14="http://schemas.microsoft.com/office/powerpoint/2010/main" val="7701401"/>
       </p:ext>
     </p:extLst>
   </p:cSld>
@@ -4493,12 +4865,14 @@
         </p:nvSpPr>
         <p:spPr/>
         <p:txBody>
-          <a:bodyPr/>
-          <a:lstStyle/>
-          <a:p>
-            <a:r>
-              <a:rPr lang="en-US" dirty="0" smtClean="0"/>
-              <a:t>Notes</a:t>
+          <a:bodyPr>
+            <a:normAutofit/>
+          </a:bodyPr>
+          <a:lstStyle/>
+          <a:p>
+            <a:r>
+              <a:rPr lang="en-US" dirty="0" smtClean="0"/>
+              <a:t>Functions</a:t>
             </a:r>
             <a:endParaRPr lang="en-US" dirty="0"/>
           </a:p>
@@ -4514,174 +4888,55 @@
             <p:ph idx="1"/>
           </p:nvPr>
         </p:nvSpPr>
-        <p:spPr>
-          <a:xfrm>
-            <a:off x="457200" y="1295400"/>
-            <a:ext cx="8229600" cy="4830763"/>
-          </a:xfrm>
-        </p:spPr>
-        <p:txBody>
-          <a:bodyPr>
-            <a:normAutofit fontScale="70000" lnSpcReduction="20000"/>
-          </a:bodyPr>
-          <a:lstStyle/>
-          <a:p>
-            <a:pPr marL="0" indent="0">
-              <a:buNone/>
-            </a:pPr>
-            <a:r>
-              <a:rPr lang="en-US" dirty="0"/>
-              <a:t>D:\db\ConfigDB&gt;mongo --version</a:t>
-            </a:r>
-          </a:p>
-          <a:p>
-            <a:pPr marL="0" indent="0">
-              <a:buNone/>
-            </a:pPr>
-            <a:r>
-              <a:rPr lang="en-US" b="1" dirty="0"/>
-              <a:t>MongoDB shell version: 3.2.8</a:t>
-            </a:r>
-          </a:p>
-          <a:p>
-            <a:pPr marL="0" indent="0">
-              <a:buNone/>
-            </a:pPr>
+        <p:spPr/>
+        <p:txBody>
+          <a:bodyPr/>
+          <a:lstStyle/>
+          <a:p>
+            <a:r>
+              <a:rPr lang="en-US" dirty="0" smtClean="0"/>
+              <a:t>Order:</a:t>
+            </a:r>
+          </a:p>
+          <a:p>
+            <a:pPr lvl="1"/>
+            <a:r>
+              <a:rPr lang="en-US" dirty="0" smtClean="0"/>
+              <a:t>Get orders by list of states (</a:t>
+            </a:r>
+            <a:r>
+              <a:rPr lang="en-US" dirty="0" err="1" smtClean="0"/>
+              <a:t>e.x</a:t>
+            </a:r>
+            <a:r>
+              <a:rPr lang="en-US" dirty="0" smtClean="0"/>
+              <a:t>: [paid, canceled])</a:t>
+            </a:r>
+          </a:p>
+          <a:p>
+            <a:pPr lvl="1"/>
+            <a:r>
+              <a:rPr lang="en-US" dirty="0" smtClean="0"/>
+              <a:t>Get order of a particular table by table id</a:t>
+            </a:r>
+          </a:p>
+          <a:p>
+            <a:pPr lvl="1"/>
+            <a:r>
+              <a:rPr lang="en-US" dirty="0" smtClean="0"/>
+              <a:t>Update order info (state, add/remove food,…)</a:t>
+            </a:r>
+          </a:p>
+          <a:p>
+            <a:pPr lvl="1"/>
             <a:endParaRPr lang="en-US" dirty="0"/>
-          </a:p>
-          <a:p>
-            <a:pPr marL="0" indent="0">
-              <a:buNone/>
-            </a:pPr>
-            <a:r>
-              <a:rPr lang="en-US" dirty="0"/>
-              <a:t>D:\db\ConfigDB&gt;mongod --version</a:t>
-            </a:r>
-          </a:p>
-          <a:p>
-            <a:pPr marL="0" indent="0">
-              <a:buNone/>
-            </a:pPr>
-            <a:r>
-              <a:rPr lang="en-US" b="1" dirty="0" err="1"/>
-              <a:t>db</a:t>
-            </a:r>
-            <a:r>
-              <a:rPr lang="en-US" b="1" dirty="0"/>
-              <a:t> version v3.2.8</a:t>
-            </a:r>
-          </a:p>
-          <a:p>
-            <a:pPr marL="0" indent="0">
-              <a:buNone/>
-            </a:pPr>
-            <a:r>
-              <a:rPr lang="en-US" dirty="0" err="1"/>
-              <a:t>git</a:t>
-            </a:r>
-            <a:r>
-              <a:rPr lang="en-US" dirty="0"/>
-              <a:t> version: ed70e33130c977bda0024c125b56d159573dbaf0</a:t>
-            </a:r>
-          </a:p>
-          <a:p>
-            <a:pPr marL="0" indent="0">
-              <a:buNone/>
-            </a:pPr>
-            <a:r>
-              <a:rPr lang="en-US" dirty="0"/>
-              <a:t>OpenSSL version: OpenSSL 1.0.1p-fips 9 Jul 2015</a:t>
-            </a:r>
-          </a:p>
-          <a:p>
-            <a:pPr marL="0" indent="0">
-              <a:buNone/>
-            </a:pPr>
-            <a:r>
-              <a:rPr lang="en-US" dirty="0"/>
-              <a:t>allocator: </a:t>
-            </a:r>
-            <a:r>
-              <a:rPr lang="en-US" dirty="0" err="1"/>
-              <a:t>tcmalloc</a:t>
-            </a:r>
-            <a:endParaRPr lang="en-US" dirty="0"/>
-          </a:p>
-          <a:p>
-            <a:pPr marL="0" indent="0">
-              <a:buNone/>
-            </a:pPr>
-            <a:r>
-              <a:rPr lang="en-US" dirty="0"/>
-              <a:t>modules: none</a:t>
-            </a:r>
-          </a:p>
-          <a:p>
-            <a:pPr marL="0" indent="0">
-              <a:buNone/>
-            </a:pPr>
-            <a:r>
-              <a:rPr lang="en-US" dirty="0"/>
-              <a:t>build environment:</a:t>
-            </a:r>
-          </a:p>
-          <a:p>
-            <a:pPr marL="0" indent="0">
-              <a:buNone/>
-            </a:pPr>
-            <a:r>
-              <a:rPr lang="en-US" dirty="0"/>
-              <a:t>    </a:t>
-            </a:r>
-            <a:r>
-              <a:rPr lang="en-US" dirty="0" err="1"/>
-              <a:t>distmod</a:t>
-            </a:r>
-            <a:r>
-              <a:rPr lang="en-US" dirty="0"/>
-              <a:t>: 2008plus-ssl</a:t>
-            </a:r>
-          </a:p>
-          <a:p>
-            <a:pPr marL="0" indent="0">
-              <a:buNone/>
-            </a:pPr>
-            <a:r>
-              <a:rPr lang="en-US" dirty="0"/>
-              <a:t>    </a:t>
-            </a:r>
-            <a:r>
-              <a:rPr lang="en-US" dirty="0" err="1"/>
-              <a:t>distarch</a:t>
-            </a:r>
-            <a:r>
-              <a:rPr lang="en-US" dirty="0"/>
-              <a:t>: x86_64</a:t>
-            </a:r>
-          </a:p>
-          <a:p>
-            <a:pPr marL="0" indent="0">
-              <a:buNone/>
-            </a:pPr>
-            <a:r>
-              <a:rPr lang="en-US" dirty="0"/>
-              <a:t>    </a:t>
-            </a:r>
-            <a:r>
-              <a:rPr lang="en-US" dirty="0" err="1"/>
-              <a:t>target_arch</a:t>
-            </a:r>
-            <a:r>
-              <a:rPr lang="en-US" dirty="0"/>
-              <a:t>: x86_64</a:t>
-            </a:r>
           </a:p>
         </p:txBody>
       </p:sp>
     </p:spTree>
     <p:extLst>
       <p:ext uri="{BB962C8B-B14F-4D97-AF65-F5344CB8AC3E}">
-        <p14:creationId xmlns:p14="http://schemas.microsoft.com/office/powerpoint/2010/main" val="1764804038"/>
+        <p14:creationId xmlns:p14="http://schemas.microsoft.com/office/powerpoint/2010/main" val="1116237151"/>
       </p:ext>
     </p:extLst>
   </p:cSld>

</xml_diff>